<commit_message>
added some slides to show example of Working Three States; added READ_ME.txt
</commit_message>
<xml_diff>
--- a/GIT.pptx
+++ b/GIT.pptx
@@ -18,6 +18,9 @@
     <p:sldId id="266" r:id="rId12"/>
     <p:sldId id="267" r:id="rId13"/>
     <p:sldId id="268" r:id="rId14"/>
+    <p:sldId id="269" r:id="rId15"/>
+    <p:sldId id="270" r:id="rId16"/>
+    <p:sldId id="271" r:id="rId17"/>
   </p:sldIdLst>
   <p:sldSz cx="12192000" cy="6858000"/>
   <p:notesSz cx="6858000" cy="9144000"/>
@@ -255,7 +258,7 @@
           <a:p>
             <a:fld id="{A3AE8486-6181-4FEA-9EF9-D92D9E0C25AC}" type="datetimeFigureOut">
               <a:rPr lang="en-US" smtClean="0"/>
-              <a:t>5/22/2018</a:t>
+              <a:t>5/23/2018</a:t>
             </a:fld>
             <a:endParaRPr lang="en-US"/>
           </a:p>
@@ -425,7 +428,7 @@
           <a:p>
             <a:fld id="{A3AE8486-6181-4FEA-9EF9-D92D9E0C25AC}" type="datetimeFigureOut">
               <a:rPr lang="en-US" smtClean="0"/>
-              <a:t>5/22/2018</a:t>
+              <a:t>5/23/2018</a:t>
             </a:fld>
             <a:endParaRPr lang="en-US"/>
           </a:p>
@@ -605,7 +608,7 @@
           <a:p>
             <a:fld id="{A3AE8486-6181-4FEA-9EF9-D92D9E0C25AC}" type="datetimeFigureOut">
               <a:rPr lang="en-US" smtClean="0"/>
-              <a:t>5/22/2018</a:t>
+              <a:t>5/23/2018</a:t>
             </a:fld>
             <a:endParaRPr lang="en-US"/>
           </a:p>
@@ -775,7 +778,7 @@
           <a:p>
             <a:fld id="{A3AE8486-6181-4FEA-9EF9-D92D9E0C25AC}" type="datetimeFigureOut">
               <a:rPr lang="en-US" smtClean="0"/>
-              <a:t>5/22/2018</a:t>
+              <a:t>5/23/2018</a:t>
             </a:fld>
             <a:endParaRPr lang="en-US"/>
           </a:p>
@@ -1021,7 +1024,7 @@
           <a:p>
             <a:fld id="{A3AE8486-6181-4FEA-9EF9-D92D9E0C25AC}" type="datetimeFigureOut">
               <a:rPr lang="en-US" smtClean="0"/>
-              <a:t>5/22/2018</a:t>
+              <a:t>5/23/2018</a:t>
             </a:fld>
             <a:endParaRPr lang="en-US"/>
           </a:p>
@@ -1253,7 +1256,7 @@
           <a:p>
             <a:fld id="{A3AE8486-6181-4FEA-9EF9-D92D9E0C25AC}" type="datetimeFigureOut">
               <a:rPr lang="en-US" smtClean="0"/>
-              <a:t>5/22/2018</a:t>
+              <a:t>5/23/2018</a:t>
             </a:fld>
             <a:endParaRPr lang="en-US"/>
           </a:p>
@@ -1620,7 +1623,7 @@
           <a:p>
             <a:fld id="{A3AE8486-6181-4FEA-9EF9-D92D9E0C25AC}" type="datetimeFigureOut">
               <a:rPr lang="en-US" smtClean="0"/>
-              <a:t>5/22/2018</a:t>
+              <a:t>5/23/2018</a:t>
             </a:fld>
             <a:endParaRPr lang="en-US"/>
           </a:p>
@@ -1738,7 +1741,7 @@
           <a:p>
             <a:fld id="{A3AE8486-6181-4FEA-9EF9-D92D9E0C25AC}" type="datetimeFigureOut">
               <a:rPr lang="en-US" smtClean="0"/>
-              <a:t>5/22/2018</a:t>
+              <a:t>5/23/2018</a:t>
             </a:fld>
             <a:endParaRPr lang="en-US"/>
           </a:p>
@@ -1833,7 +1836,7 @@
           <a:p>
             <a:fld id="{A3AE8486-6181-4FEA-9EF9-D92D9E0C25AC}" type="datetimeFigureOut">
               <a:rPr lang="en-US" smtClean="0"/>
-              <a:t>5/22/2018</a:t>
+              <a:t>5/23/2018</a:t>
             </a:fld>
             <a:endParaRPr lang="en-US"/>
           </a:p>
@@ -2110,7 +2113,7 @@
           <a:p>
             <a:fld id="{A3AE8486-6181-4FEA-9EF9-D92D9E0C25AC}" type="datetimeFigureOut">
               <a:rPr lang="en-US" smtClean="0"/>
-              <a:t>5/22/2018</a:t>
+              <a:t>5/23/2018</a:t>
             </a:fld>
             <a:endParaRPr lang="en-US"/>
           </a:p>
@@ -2363,7 +2366,7 @@
           <a:p>
             <a:fld id="{A3AE8486-6181-4FEA-9EF9-D92D9E0C25AC}" type="datetimeFigureOut">
               <a:rPr lang="en-US" smtClean="0"/>
-              <a:t>5/22/2018</a:t>
+              <a:t>5/23/2018</a:t>
             </a:fld>
             <a:endParaRPr lang="en-US"/>
           </a:p>
@@ -2576,7 +2579,7 @@
           <a:p>
             <a:fld id="{A3AE8486-6181-4FEA-9EF9-D92D9E0C25AC}" type="datetimeFigureOut">
               <a:rPr lang="en-US" smtClean="0"/>
-              <a:t>5/22/2018</a:t>
+              <a:t>5/23/2018</a:t>
             </a:fld>
             <a:endParaRPr lang="en-US"/>
           </a:p>
@@ -3023,8 +3026,13 @@
           <a:p>
             <a:r>
               <a:rPr lang="nl-BE" dirty="0" smtClean="0"/>
-              <a:t>Een korte presentatie</a:t>
-            </a:r>
+              <a:t>A short </a:t>
+            </a:r>
+            <a:r>
+              <a:rPr lang="nl-BE" dirty="0" err="1" smtClean="0"/>
+              <a:t>presentation</a:t>
+            </a:r>
+            <a:endParaRPr lang="nl-BE" dirty="0" smtClean="0"/>
           </a:p>
           <a:p>
             <a:endParaRPr lang="nl-BE" dirty="0"/>
@@ -3153,15 +3161,7 @@
           <a:p>
             <a:r>
               <a:rPr lang="nl-BE" dirty="0" smtClean="0"/>
-              <a:t>GUI </a:t>
-            </a:r>
-            <a:r>
-              <a:rPr lang="nl-BE" dirty="0" err="1" smtClean="0"/>
-              <a:t>bvb</a:t>
-            </a:r>
-            <a:r>
-              <a:rPr lang="nl-BE" dirty="0" smtClean="0"/>
-              <a:t> : </a:t>
+              <a:t>GUI ex.: </a:t>
             </a:r>
             <a:r>
               <a:rPr lang="nl-BE" dirty="0" err="1" smtClean="0"/>
@@ -3198,7 +3198,15 @@
           <a:p>
             <a:r>
               <a:rPr lang="nl-BE" dirty="0" smtClean="0"/>
-              <a:t>GUI tools gebruiken GIT </a:t>
+              <a:t>GUI tools </a:t>
+            </a:r>
+            <a:r>
+              <a:rPr lang="nl-BE" dirty="0" err="1" smtClean="0"/>
+              <a:t>use</a:t>
+            </a:r>
+            <a:r>
+              <a:rPr lang="nl-BE" dirty="0" smtClean="0"/>
+              <a:t> GIT </a:t>
             </a:r>
             <a:r>
               <a:rPr lang="nl-BE" dirty="0" err="1" smtClean="0"/>
@@ -3206,21 +3214,41 @@
             </a:r>
             <a:r>
               <a:rPr lang="nl-BE" dirty="0" smtClean="0"/>
-              <a:t> achter de schermen</a:t>
+              <a:t> </a:t>
+            </a:r>
+            <a:r>
+              <a:rPr lang="nl-BE" dirty="0" err="1" smtClean="0"/>
+              <a:t>behind</a:t>
+            </a:r>
+            <a:r>
+              <a:rPr lang="nl-BE" dirty="0" smtClean="0"/>
+              <a:t> </a:t>
+            </a:r>
+            <a:r>
+              <a:rPr lang="nl-BE" dirty="0" err="1" smtClean="0"/>
+              <a:t>the</a:t>
+            </a:r>
+            <a:r>
+              <a:rPr lang="nl-BE" dirty="0" smtClean="0"/>
+              <a:t> </a:t>
+            </a:r>
+            <a:r>
+              <a:rPr lang="nl-BE" dirty="0" err="1" smtClean="0"/>
+              <a:t>screens</a:t>
             </a:r>
             <a:endParaRPr lang="nl-BE" dirty="0" smtClean="0"/>
           </a:p>
           <a:p>
             <a:r>
-              <a:rPr lang="nl-BE" dirty="0" smtClean="0"/>
-              <a:t>Om git snel te leren is het best de CLI te gebruiken</a:t>
-            </a:r>
-          </a:p>
-          <a:p>
-            <a:r>
-              <a:rPr lang="nl-BE" dirty="0" smtClean="0"/>
-              <a:t>Ikzelf gebruik </a:t>
-            </a:r>
+              <a:rPr lang="nl-BE" dirty="0" err="1" smtClean="0"/>
+              <a:t>Use</a:t>
+            </a:r>
+            <a:r>
+              <a:rPr lang="nl-BE" dirty="0" smtClean="0"/>
+              <a:t> CLI!</a:t>
+            </a:r>
+          </a:p>
+          <a:p>
             <a:r>
               <a:rPr lang="nl-BE" dirty="0" err="1" smtClean="0"/>
               <a:t>GitBash</a:t>
@@ -3306,7 +3334,15 @@
           <a:p>
             <a:r>
               <a:rPr lang="nl-BE" dirty="0" smtClean="0"/>
-              <a:t>1. Creëer een nieuwe </a:t>
+              <a:t>1. </a:t>
+            </a:r>
+            <a:r>
+              <a:rPr lang="nl-BE" dirty="0" err="1" smtClean="0"/>
+              <a:t>Create</a:t>
+            </a:r>
+            <a:r>
+              <a:rPr lang="nl-BE" dirty="0" smtClean="0"/>
+              <a:t> new </a:t>
             </a:r>
             <a:r>
               <a:rPr lang="nl-BE" dirty="0" err="1" smtClean="0"/>
@@ -3314,7 +3350,7 @@
             </a:r>
             <a:r>
               <a:rPr lang="nl-BE" dirty="0" smtClean="0"/>
-              <a:t> op GitHub</a:t>
+              <a:t> on GitHub</a:t>
             </a:r>
           </a:p>
           <a:p>
@@ -3331,11 +3367,27 @@
           <a:p>
             <a:r>
               <a:rPr lang="nl-BE" dirty="0" smtClean="0"/>
-              <a:t>3. Verander werk directory naar </a:t>
-            </a:r>
-            <a:r>
-              <a:rPr lang="nl-BE" dirty="0" err="1" smtClean="0"/>
-              <a:t>locaal</a:t>
+              <a:t>3. Change </a:t>
+            </a:r>
+            <a:r>
+              <a:rPr lang="nl-BE" dirty="0" err="1" smtClean="0"/>
+              <a:t>working</a:t>
+            </a:r>
+            <a:r>
+              <a:rPr lang="nl-BE" dirty="0" smtClean="0"/>
+              <a:t> directory </a:t>
+            </a:r>
+            <a:r>
+              <a:rPr lang="nl-BE" dirty="0" err="1" smtClean="0"/>
+              <a:t>to</a:t>
+            </a:r>
+            <a:r>
+              <a:rPr lang="nl-BE" dirty="0" smtClean="0"/>
+              <a:t> </a:t>
+            </a:r>
+            <a:r>
+              <a:rPr lang="nl-BE" dirty="0" err="1" smtClean="0"/>
+              <a:t>local</a:t>
             </a:r>
             <a:r>
               <a:rPr lang="nl-BE" dirty="0" smtClean="0"/>
@@ -3345,37 +3397,45 @@
           <a:p>
             <a:r>
               <a:rPr lang="nl-BE" dirty="0" smtClean="0"/>
-              <a:t>4</a:t>
-            </a:r>
-            <a:r>
-              <a:rPr lang="nl-BE" dirty="0" smtClean="0"/>
-              <a:t>. </a:t>
-            </a:r>
-            <a:r>
-              <a:rPr lang="nl-BE" dirty="0" err="1" smtClean="0"/>
-              <a:t>Initialiseer</a:t>
-            </a:r>
-            <a:r>
-              <a:rPr lang="nl-BE" dirty="0" smtClean="0"/>
+              <a:t>4. </a:t>
+            </a:r>
+            <a:r>
+              <a:rPr lang="nl-BE" dirty="0" err="1"/>
+              <a:t>Initialize</a:t>
+            </a:r>
+            <a:r>
+              <a:rPr lang="nl-BE" dirty="0"/>
               <a:t> </a:t>
             </a:r>
             <a:r>
-              <a:rPr lang="nl-BE" dirty="0" smtClean="0"/>
-              <a:t>de </a:t>
-            </a:r>
-            <a:r>
-              <a:rPr lang="nl-BE" dirty="0" err="1" smtClean="0"/>
-              <a:t>locale</a:t>
-            </a:r>
-            <a:r>
-              <a:rPr lang="nl-BE" dirty="0" smtClean="0"/>
-              <a:t> directory als een Git </a:t>
+              <a:rPr lang="nl-BE" dirty="0" err="1"/>
+              <a:t>local</a:t>
+            </a:r>
+            <a:r>
+              <a:rPr lang="nl-BE" dirty="0"/>
+              <a:t> directory </a:t>
+            </a:r>
+            <a:r>
+              <a:rPr lang="nl-BE" dirty="0" err="1"/>
+              <a:t>to</a:t>
+            </a:r>
+            <a:r>
+              <a:rPr lang="nl-BE" dirty="0"/>
+              <a:t> </a:t>
+            </a:r>
+            <a:r>
+              <a:rPr lang="nl-BE" dirty="0" err="1" smtClean="0"/>
+              <a:t>local</a:t>
+            </a:r>
+            <a:r>
+              <a:rPr lang="nl-BE" dirty="0" smtClean="0"/>
+              <a:t> Git </a:t>
             </a:r>
             <a:r>
               <a:rPr lang="nl-BE" dirty="0" err="1" smtClean="0"/>
               <a:t>repository</a:t>
             </a:r>
-            <a:endParaRPr lang="nl-BE" dirty="0" smtClean="0"/>
+            <a:endParaRPr lang="nl-BE" dirty="0"/>
           </a:p>
           <a:p>
             <a:endParaRPr lang="nl-BE" dirty="0" smtClean="0"/>
@@ -3401,7 +3461,7 @@
         </p:blipFill>
         <p:spPr>
           <a:xfrm>
-            <a:off x="1095511" y="3794079"/>
+            <a:off x="1508107" y="4106313"/>
             <a:ext cx="8982075" cy="981075"/>
           </a:xfrm>
           <a:prstGeom prst="rect">
@@ -3419,6 +3479,13 @@
   <p:clrMapOvr>
     <a:masterClrMapping/>
   </p:clrMapOvr>
+  <p:timing>
+    <p:tnLst>
+      <p:par>
+        <p:cTn id="1" dur="indefinite" restart="never" nodeType="tmRoot"/>
+      </p:par>
+    </p:tnLst>
+  </p:timing>
 </p:sld>
 </file>
 
@@ -3479,11 +3546,19 @@
           <a:p>
             <a:r>
               <a:rPr lang="nl-BE" dirty="0" smtClean="0"/>
-              <a:t>5. Voeg de files toe in </a:t>
-            </a:r>
-            <a:r>
-              <a:rPr lang="nl-BE" dirty="0" err="1" smtClean="0"/>
-              <a:t>locale</a:t>
+              <a:t>5. </a:t>
+            </a:r>
+            <a:r>
+              <a:rPr lang="nl-BE" dirty="0" err="1" smtClean="0"/>
+              <a:t>Add</a:t>
+            </a:r>
+            <a:r>
+              <a:rPr lang="nl-BE" dirty="0" smtClean="0"/>
+              <a:t> files </a:t>
+            </a:r>
+            <a:r>
+              <a:rPr lang="nl-BE" dirty="0" err="1" smtClean="0"/>
+              <a:t>to</a:t>
             </a:r>
             <a:r>
               <a:rPr lang="nl-BE" dirty="0" smtClean="0"/>
@@ -3491,6 +3566,14 @@
             </a:r>
             <a:r>
               <a:rPr lang="nl-BE" dirty="0" err="1" smtClean="0"/>
+              <a:t>local</a:t>
+            </a:r>
+            <a:r>
+              <a:rPr lang="nl-BE" dirty="0" smtClean="0"/>
+              <a:t> </a:t>
+            </a:r>
+            <a:r>
+              <a:rPr lang="nl-BE" dirty="0" err="1" smtClean="0"/>
               <a:t>repository</a:t>
             </a:r>
             <a:endParaRPr lang="nl-BE" dirty="0" smtClean="0"/>
@@ -3502,6 +3585,9 @@
             </a:r>
           </a:p>
           <a:p>
+            <a:endParaRPr lang="nl-BE" dirty="0" smtClean="0"/>
+          </a:p>
+          <a:p>
             <a:r>
               <a:rPr lang="nl-BE" dirty="0" smtClean="0"/>
               <a:t>6. </a:t>
@@ -3512,7 +3598,15 @@
             </a:r>
             <a:r>
               <a:rPr lang="nl-BE" dirty="0" smtClean="0"/>
-              <a:t> de files</a:t>
+              <a:t> </a:t>
+            </a:r>
+            <a:r>
+              <a:rPr lang="nl-BE" dirty="0" err="1" smtClean="0"/>
+              <a:t>the</a:t>
+            </a:r>
+            <a:r>
+              <a:rPr lang="nl-BE" dirty="0" smtClean="0"/>
+              <a:t> files</a:t>
             </a:r>
           </a:p>
           <a:p>
@@ -3525,14 +3619,9 @@
             <a:endParaRPr lang="nl-BE" dirty="0"/>
           </a:p>
           <a:p>
-            <a:r>
-              <a:rPr lang="nl-BE" dirty="0" smtClean="0"/>
-              <a:t>7. link project naar de remote </a:t>
-            </a:r>
-            <a:r>
-              <a:rPr lang="nl-BE" dirty="0" err="1" smtClean="0"/>
-              <a:t>repository</a:t>
-            </a:r>
+            <a:pPr marL="0" indent="0">
+              <a:buNone/>
+            </a:pPr>
             <a:endParaRPr lang="nl-BE" dirty="0" smtClean="0"/>
           </a:p>
           <a:p>
@@ -3583,7 +3672,7 @@
         </p:blipFill>
         <p:spPr>
           <a:xfrm>
-            <a:off x="1045573" y="3282156"/>
+            <a:off x="1045573" y="4001294"/>
             <a:ext cx="6086475" cy="1438275"/>
           </a:xfrm>
           <a:prstGeom prst="rect">
@@ -3601,6 +3690,13 @@
   <p:clrMapOvr>
     <a:masterClrMapping/>
   </p:clrMapOvr>
+  <p:timing>
+    <p:tnLst>
+      <p:par>
+        <p:cTn id="1" dur="indefinite" restart="never" nodeType="tmRoot"/>
+      </p:par>
+    </p:tnLst>
+  </p:timing>
 </p:sld>
 </file>
 
@@ -3636,7 +3732,11 @@
           <a:bodyPr/>
           <a:lstStyle/>
           <a:p>
-            <a:endParaRPr lang="en-US"/>
+            <a:r>
+              <a:rPr lang="nl-BE" dirty="0" err="1" smtClean="0"/>
+              <a:t>MyFirstGitProject</a:t>
+            </a:r>
+            <a:endParaRPr lang="en-US" dirty="0"/>
           </a:p>
         </p:txBody>
       </p:sp>
@@ -3746,6 +3846,450 @@
   <p:clrMapOvr>
     <a:masterClrMapping/>
   </p:clrMapOvr>
+  <p:timing>
+    <p:tnLst>
+      <p:par>
+        <p:cTn id="1" dur="indefinite" restart="never" nodeType="tmRoot"/>
+      </p:par>
+    </p:tnLst>
+  </p:timing>
+</p:sld>
+</file>
+
+<file path=ppt/slides/slide14.xml><?xml version="1.0" encoding="utf-8"?>
+<p:sld xmlns:a="http://schemas.openxmlformats.org/drawingml/2006/main" xmlns:r="http://schemas.openxmlformats.org/officeDocument/2006/relationships" xmlns:p="http://schemas.openxmlformats.org/presentationml/2006/main">
+  <p:cSld>
+    <p:spTree>
+      <p:nvGrpSpPr>
+        <p:cNvPr id="1" name=""/>
+        <p:cNvGrpSpPr/>
+        <p:nvPr/>
+      </p:nvGrpSpPr>
+      <p:grpSpPr>
+        <a:xfrm>
+          <a:off x="0" y="0"/>
+          <a:ext cx="0" cy="0"/>
+          <a:chOff x="0" y="0"/>
+          <a:chExt cx="0" cy="0"/>
+        </a:xfrm>
+      </p:grpSpPr>
+      <p:sp>
+        <p:nvSpPr>
+          <p:cNvPr id="2" name="Title 1"/>
+          <p:cNvSpPr>
+            <a:spLocks noGrp="1"/>
+          </p:cNvSpPr>
+          <p:nvPr>
+            <p:ph type="title"/>
+          </p:nvPr>
+        </p:nvSpPr>
+        <p:spPr/>
+        <p:txBody>
+          <a:bodyPr/>
+          <a:lstStyle/>
+          <a:p>
+            <a:r>
+              <a:rPr lang="nl-BE" dirty="0" err="1" smtClean="0"/>
+              <a:t>Working</a:t>
+            </a:r>
+            <a:r>
+              <a:rPr lang="nl-BE" dirty="0" smtClean="0"/>
+              <a:t> Tree </a:t>
+            </a:r>
+            <a:r>
+              <a:rPr lang="nl-BE" dirty="0" err="1" smtClean="0"/>
+              <a:t>States</a:t>
+            </a:r>
+            <a:endParaRPr lang="en-US" dirty="0"/>
+          </a:p>
+        </p:txBody>
+      </p:sp>
+      <p:sp>
+        <p:nvSpPr>
+          <p:cNvPr id="3" name="Content Placeholder 2"/>
+          <p:cNvSpPr>
+            <a:spLocks noGrp="1"/>
+          </p:cNvSpPr>
+          <p:nvPr>
+            <p:ph idx="1"/>
+          </p:nvPr>
+        </p:nvSpPr>
+        <p:spPr/>
+        <p:txBody>
+          <a:bodyPr/>
+          <a:lstStyle/>
+          <a:p>
+            <a:r>
+              <a:rPr lang="nl-BE" dirty="0" smtClean="0"/>
+              <a:t>4 </a:t>
+            </a:r>
+            <a:r>
+              <a:rPr lang="nl-BE" dirty="0" err="1" smtClean="0"/>
+              <a:t>states</a:t>
+            </a:r>
+            <a:endParaRPr lang="nl-BE" dirty="0"/>
+          </a:p>
+          <a:p>
+            <a:r>
+              <a:rPr lang="nl-BE" dirty="0" err="1" smtClean="0"/>
+              <a:t>Untracked</a:t>
+            </a:r>
+            <a:r>
+              <a:rPr lang="nl-BE" dirty="0" smtClean="0"/>
+              <a:t>: </a:t>
+            </a:r>
+            <a:r>
+              <a:rPr lang="nl-BE" dirty="0" err="1" smtClean="0"/>
+              <a:t>newly</a:t>
+            </a:r>
+            <a:r>
+              <a:rPr lang="nl-BE" dirty="0" smtClean="0"/>
+              <a:t> </a:t>
+            </a:r>
+            <a:r>
+              <a:rPr lang="nl-BE" dirty="0" err="1" smtClean="0"/>
+              <a:t>added</a:t>
+            </a:r>
+            <a:r>
+              <a:rPr lang="nl-BE" dirty="0" smtClean="0"/>
+              <a:t> files (red)</a:t>
+            </a:r>
+          </a:p>
+          <a:p>
+            <a:r>
+              <a:rPr lang="nl-BE" dirty="0" err="1" smtClean="0"/>
+              <a:t>Unstaged</a:t>
+            </a:r>
+            <a:r>
+              <a:rPr lang="nl-BE" dirty="0" smtClean="0"/>
+              <a:t>: </a:t>
+            </a:r>
+            <a:r>
+              <a:rPr lang="nl-BE" dirty="0" err="1" smtClean="0"/>
+              <a:t>changed</a:t>
+            </a:r>
+            <a:r>
+              <a:rPr lang="nl-BE" dirty="0" smtClean="0"/>
+              <a:t> files </a:t>
+            </a:r>
+            <a:r>
+              <a:rPr lang="nl-BE" dirty="0" err="1" smtClean="0"/>
+              <a:t>already</a:t>
+            </a:r>
+            <a:r>
+              <a:rPr lang="nl-BE" dirty="0" smtClean="0"/>
+              <a:t> </a:t>
+            </a:r>
+            <a:r>
+              <a:rPr lang="nl-BE" dirty="0" err="1" smtClean="0"/>
+              <a:t>known</a:t>
+            </a:r>
+            <a:r>
+              <a:rPr lang="nl-BE" dirty="0" smtClean="0"/>
+              <a:t> </a:t>
+            </a:r>
+            <a:r>
+              <a:rPr lang="nl-BE" dirty="0" err="1" smtClean="0"/>
+              <a:t>by</a:t>
+            </a:r>
+            <a:r>
+              <a:rPr lang="nl-BE" dirty="0" smtClean="0"/>
+              <a:t> git; </a:t>
+            </a:r>
+            <a:r>
+              <a:rPr lang="nl-BE" dirty="0" err="1" smtClean="0"/>
+              <a:t>not</a:t>
+            </a:r>
+            <a:r>
+              <a:rPr lang="nl-BE" dirty="0" smtClean="0"/>
+              <a:t> </a:t>
+            </a:r>
+            <a:r>
+              <a:rPr lang="nl-BE" dirty="0" err="1" smtClean="0"/>
+              <a:t>included</a:t>
+            </a:r>
+            <a:r>
+              <a:rPr lang="nl-BE" dirty="0" smtClean="0"/>
+              <a:t> in next </a:t>
+            </a:r>
+            <a:r>
+              <a:rPr lang="nl-BE" dirty="0" err="1" smtClean="0"/>
+              <a:t>commit</a:t>
+            </a:r>
+            <a:r>
+              <a:rPr lang="nl-BE" dirty="0"/>
+              <a:t> </a:t>
+            </a:r>
+            <a:r>
+              <a:rPr lang="nl-BE" dirty="0" smtClean="0"/>
+              <a:t>(red)</a:t>
+            </a:r>
+          </a:p>
+          <a:p>
+            <a:r>
+              <a:rPr lang="nl-BE" dirty="0" err="1" smtClean="0"/>
+              <a:t>Staged</a:t>
+            </a:r>
+            <a:r>
+              <a:rPr lang="nl-BE" dirty="0" smtClean="0"/>
+              <a:t>: </a:t>
+            </a:r>
+            <a:r>
+              <a:rPr lang="nl-BE" dirty="0" err="1" smtClean="0"/>
+              <a:t>changed</a:t>
+            </a:r>
+            <a:r>
+              <a:rPr lang="nl-BE" dirty="0" smtClean="0"/>
+              <a:t> files </a:t>
+            </a:r>
+            <a:r>
+              <a:rPr lang="nl-BE" dirty="0" err="1" smtClean="0"/>
+              <a:t>included</a:t>
+            </a:r>
+            <a:r>
+              <a:rPr lang="nl-BE" dirty="0" smtClean="0"/>
+              <a:t> in next </a:t>
+            </a:r>
+            <a:r>
+              <a:rPr lang="nl-BE" dirty="0" err="1" smtClean="0"/>
+              <a:t>commit</a:t>
+            </a:r>
+            <a:r>
+              <a:rPr lang="nl-BE" dirty="0" smtClean="0"/>
+              <a:t> (green)</a:t>
+            </a:r>
+          </a:p>
+          <a:p>
+            <a:r>
+              <a:rPr lang="nl-BE" dirty="0" err="1" smtClean="0"/>
+              <a:t>Commited</a:t>
+            </a:r>
+            <a:r>
+              <a:rPr lang="nl-BE" dirty="0" smtClean="0"/>
+              <a:t>: </a:t>
+            </a:r>
+            <a:r>
+              <a:rPr lang="nl-BE" dirty="0" err="1" smtClean="0"/>
+              <a:t>Saved</a:t>
+            </a:r>
+            <a:r>
+              <a:rPr lang="nl-BE" dirty="0" smtClean="0"/>
+              <a:t> files </a:t>
+            </a:r>
+            <a:r>
+              <a:rPr lang="nl-BE" dirty="0" err="1" smtClean="0"/>
+              <a:t>into</a:t>
+            </a:r>
+            <a:r>
+              <a:rPr lang="nl-BE" dirty="0" smtClean="0"/>
+              <a:t> git </a:t>
+            </a:r>
+            <a:r>
+              <a:rPr lang="nl-BE" dirty="0" err="1" smtClean="0"/>
+              <a:t>and</a:t>
+            </a:r>
+            <a:r>
+              <a:rPr lang="nl-BE" dirty="0" smtClean="0"/>
+              <a:t> has no changes </a:t>
+            </a:r>
+            <a:r>
+              <a:rPr lang="nl-BE" dirty="0" err="1" smtClean="0"/>
+              <a:t>since</a:t>
+            </a:r>
+            <a:r>
+              <a:rPr lang="nl-BE" dirty="0" smtClean="0"/>
+              <a:t>. </a:t>
+            </a:r>
+            <a:r>
+              <a:rPr lang="nl-BE" dirty="0" err="1" smtClean="0"/>
+              <a:t>Considered</a:t>
+            </a:r>
+            <a:r>
+              <a:rPr lang="nl-BE" dirty="0" smtClean="0"/>
+              <a:t> clean.</a:t>
+            </a:r>
+          </a:p>
+          <a:p>
+            <a:endParaRPr lang="en-US" dirty="0"/>
+          </a:p>
+        </p:txBody>
+      </p:sp>
+    </p:spTree>
+    <p:extLst>
+      <p:ext uri="{BB962C8B-B14F-4D97-AF65-F5344CB8AC3E}">
+        <p14:creationId xmlns:p14="http://schemas.microsoft.com/office/powerpoint/2010/main" val="3438197317"/>
+      </p:ext>
+    </p:extLst>
+  </p:cSld>
+  <p:clrMapOvr>
+    <a:masterClrMapping/>
+  </p:clrMapOvr>
+  <p:timing>
+    <p:tnLst>
+      <p:par>
+        <p:cTn id="1" dur="indefinite" restart="never" nodeType="tmRoot"/>
+      </p:par>
+    </p:tnLst>
+  </p:timing>
+</p:sld>
+</file>
+
+<file path=ppt/slides/slide15.xml><?xml version="1.0" encoding="utf-8"?>
+<p:sld xmlns:a="http://schemas.openxmlformats.org/drawingml/2006/main" xmlns:r="http://schemas.openxmlformats.org/officeDocument/2006/relationships" xmlns:p="http://schemas.openxmlformats.org/presentationml/2006/main">
+  <p:cSld>
+    <p:spTree>
+      <p:nvGrpSpPr>
+        <p:cNvPr id="1" name=""/>
+        <p:cNvGrpSpPr/>
+        <p:nvPr/>
+      </p:nvGrpSpPr>
+      <p:grpSpPr>
+        <a:xfrm>
+          <a:off x="0" y="0"/>
+          <a:ext cx="0" cy="0"/>
+          <a:chOff x="0" y="0"/>
+          <a:chExt cx="0" cy="0"/>
+        </a:xfrm>
+      </p:grpSpPr>
+      <p:sp>
+        <p:nvSpPr>
+          <p:cNvPr id="2" name="Title 1"/>
+          <p:cNvSpPr>
+            <a:spLocks noGrp="1"/>
+          </p:cNvSpPr>
+          <p:nvPr>
+            <p:ph type="title"/>
+          </p:nvPr>
+        </p:nvSpPr>
+        <p:spPr/>
+        <p:txBody>
+          <a:bodyPr/>
+          <a:lstStyle/>
+          <a:p>
+            <a:endParaRPr lang="en-US"/>
+          </a:p>
+        </p:txBody>
+      </p:sp>
+      <p:sp>
+        <p:nvSpPr>
+          <p:cNvPr id="3" name="Content Placeholder 2"/>
+          <p:cNvSpPr>
+            <a:spLocks noGrp="1"/>
+          </p:cNvSpPr>
+          <p:nvPr>
+            <p:ph idx="1"/>
+          </p:nvPr>
+        </p:nvSpPr>
+        <p:spPr/>
+        <p:txBody>
+          <a:bodyPr/>
+          <a:lstStyle/>
+          <a:p>
+            <a:endParaRPr lang="en-US"/>
+          </a:p>
+        </p:txBody>
+      </p:sp>
+    </p:spTree>
+    <p:extLst>
+      <p:ext uri="{BB962C8B-B14F-4D97-AF65-F5344CB8AC3E}">
+        <p14:creationId xmlns:p14="http://schemas.microsoft.com/office/powerpoint/2010/main" val="1055543469"/>
+      </p:ext>
+    </p:extLst>
+  </p:cSld>
+  <p:clrMapOvr>
+    <a:masterClrMapping/>
+  </p:clrMapOvr>
+</p:sld>
+</file>
+
+<file path=ppt/slides/slide16.xml><?xml version="1.0" encoding="utf-8"?>
+<p:sld xmlns:a="http://schemas.openxmlformats.org/drawingml/2006/main" xmlns:r="http://schemas.openxmlformats.org/officeDocument/2006/relationships" xmlns:p="http://schemas.openxmlformats.org/presentationml/2006/main">
+  <p:cSld>
+    <p:spTree>
+      <p:nvGrpSpPr>
+        <p:cNvPr id="1" name=""/>
+        <p:cNvGrpSpPr/>
+        <p:nvPr/>
+      </p:nvGrpSpPr>
+      <p:grpSpPr>
+        <a:xfrm>
+          <a:off x="0" y="0"/>
+          <a:ext cx="0" cy="0"/>
+          <a:chOff x="0" y="0"/>
+          <a:chExt cx="0" cy="0"/>
+        </a:xfrm>
+      </p:grpSpPr>
+      <p:sp>
+        <p:nvSpPr>
+          <p:cNvPr id="2" name="Title 1"/>
+          <p:cNvSpPr>
+            <a:spLocks noGrp="1"/>
+          </p:cNvSpPr>
+          <p:nvPr>
+            <p:ph type="title"/>
+          </p:nvPr>
+        </p:nvSpPr>
+        <p:spPr/>
+        <p:txBody>
+          <a:bodyPr/>
+          <a:lstStyle/>
+          <a:p>
+            <a:r>
+              <a:rPr lang="nl-BE" dirty="0" err="1" smtClean="0"/>
+              <a:t>Unstaged</a:t>
+            </a:r>
+            <a:r>
+              <a:rPr lang="nl-BE" dirty="0"/>
+              <a:t> </a:t>
+            </a:r>
+            <a:r>
+              <a:rPr lang="nl-BE" dirty="0" smtClean="0"/>
+              <a:t>/ </a:t>
+            </a:r>
+            <a:r>
+              <a:rPr lang="nl-BE" dirty="0" err="1" smtClean="0"/>
+              <a:t>Untracked</a:t>
+            </a:r>
+            <a:endParaRPr lang="en-US" dirty="0"/>
+          </a:p>
+        </p:txBody>
+      </p:sp>
+      <p:pic>
+        <p:nvPicPr>
+          <p:cNvPr id="4" name="Content Placeholder 3"/>
+          <p:cNvPicPr>
+            <a:picLocks noGrp="1" noChangeAspect="1"/>
+          </p:cNvPicPr>
+          <p:nvPr>
+            <p:ph idx="1"/>
+          </p:nvPr>
+        </p:nvPicPr>
+        <p:blipFill>
+          <a:blip r:embed="rId2"/>
+          <a:stretch>
+            <a:fillRect/>
+          </a:stretch>
+        </p:blipFill>
+        <p:spPr>
+          <a:xfrm>
+            <a:off x="1271587" y="2362994"/>
+            <a:ext cx="9648825" cy="3276600"/>
+          </a:xfrm>
+          <a:prstGeom prst="rect">
+            <a:avLst/>
+          </a:prstGeom>
+        </p:spPr>
+      </p:pic>
+    </p:spTree>
+    <p:extLst>
+      <p:ext uri="{BB962C8B-B14F-4D97-AF65-F5344CB8AC3E}">
+        <p14:creationId xmlns:p14="http://schemas.microsoft.com/office/powerpoint/2010/main" val="2060847589"/>
+      </p:ext>
+    </p:extLst>
+  </p:cSld>
+  <p:clrMapOvr>
+    <a:masterClrMapping/>
+  </p:clrMapOvr>
 </p:sld>
 </file>
 
@@ -3783,7 +4327,7 @@
           <a:p>
             <a:r>
               <a:rPr lang="nl-BE" dirty="0" smtClean="0"/>
-              <a:t>Wat is een VCS?</a:t>
+              <a:t>VCS?</a:t>
             </a:r>
             <a:endParaRPr lang="en-US" dirty="0"/>
           </a:p>
@@ -3817,7 +4361,15 @@
           <a:p>
             <a:r>
               <a:rPr lang="nl-BE" dirty="0" smtClean="0"/>
-              <a:t>Een systeem dat veranderingen bijhoudt</a:t>
+              <a:t>System </a:t>
+            </a:r>
+            <a:r>
+              <a:rPr lang="nl-BE" dirty="0" err="1" smtClean="0"/>
+              <a:t>that</a:t>
+            </a:r>
+            <a:r>
+              <a:rPr lang="nl-BE" dirty="0" smtClean="0"/>
+              <a:t> records changes of files</a:t>
             </a:r>
           </a:p>
           <a:p>
@@ -3831,8 +4383,12 @@
               <a:buNone/>
             </a:pPr>
             <a:r>
-              <a:rPr lang="nl-BE" dirty="0" smtClean="0"/>
-              <a:t>Voordelen:</a:t>
+              <a:rPr lang="nl-BE" dirty="0" err="1" smtClean="0"/>
+              <a:t>Advantages</a:t>
+            </a:r>
+            <a:r>
+              <a:rPr lang="nl-BE" dirty="0" smtClean="0"/>
+              <a:t>:</a:t>
             </a:r>
           </a:p>
           <a:p>
@@ -4088,27 +4644,55 @@
           <a:lstStyle/>
           <a:p>
             <a:r>
-              <a:rPr lang="nl-BE" dirty="0" smtClean="0"/>
-              <a:t>Harde schijf</a:t>
-            </a:r>
-          </a:p>
-          <a:p>
-            <a:r>
-              <a:rPr lang="nl-BE" dirty="0" smtClean="0"/>
-              <a:t>Moeilijk om werk te delen</a:t>
-            </a:r>
-          </a:p>
-          <a:p>
-            <a:r>
-              <a:rPr lang="nl-BE" dirty="0" smtClean="0"/>
-              <a:t>Hoog risico om werk te verliezen</a:t>
-            </a:r>
-          </a:p>
-          <a:p>
-            <a:r>
-              <a:rPr lang="nl-BE" dirty="0" smtClean="0"/>
-              <a:t>Alles op 1 machine</a:t>
-            </a:r>
+              <a:rPr lang="nl-BE" dirty="0" err="1" smtClean="0"/>
+              <a:t>One</a:t>
+            </a:r>
+            <a:r>
+              <a:rPr lang="nl-BE" dirty="0" smtClean="0"/>
+              <a:t> machine</a:t>
+            </a:r>
+          </a:p>
+          <a:p>
+            <a:r>
+              <a:rPr lang="nl-BE" dirty="0" err="1" smtClean="0"/>
+              <a:t>Difficult</a:t>
+            </a:r>
+            <a:r>
+              <a:rPr lang="nl-BE" dirty="0" smtClean="0"/>
+              <a:t> </a:t>
+            </a:r>
+            <a:r>
+              <a:rPr lang="nl-BE" dirty="0" err="1" smtClean="0"/>
+              <a:t>to</a:t>
+            </a:r>
+            <a:r>
+              <a:rPr lang="nl-BE" dirty="0" smtClean="0"/>
+              <a:t> share </a:t>
+            </a:r>
+            <a:r>
+              <a:rPr lang="nl-BE" dirty="0" err="1" smtClean="0"/>
+              <a:t>work</a:t>
+            </a:r>
+            <a:endParaRPr lang="nl-BE" dirty="0" smtClean="0"/>
+          </a:p>
+          <a:p>
+            <a:r>
+              <a:rPr lang="nl-BE" dirty="0" smtClean="0"/>
+              <a:t>High risk of </a:t>
+            </a:r>
+            <a:r>
+              <a:rPr lang="nl-BE" dirty="0" err="1" smtClean="0"/>
+              <a:t>losing</a:t>
+            </a:r>
+            <a:r>
+              <a:rPr lang="nl-BE" dirty="0" smtClean="0"/>
+              <a:t> </a:t>
+            </a:r>
+            <a:r>
+              <a:rPr lang="nl-BE" dirty="0" err="1" smtClean="0"/>
+              <a:t>work</a:t>
+            </a:r>
+            <a:endParaRPr lang="nl-BE" dirty="0" smtClean="0"/>
           </a:p>
           <a:p>
             <a:r>
@@ -4239,27 +4823,93 @@
           <a:lstStyle/>
           <a:p>
             <a:r>
-              <a:rPr lang="nl-BE" dirty="0" smtClean="0"/>
-              <a:t>Bewaard veranderingen in een centrale database</a:t>
-            </a:r>
-          </a:p>
-          <a:p>
-            <a:r>
-              <a:rPr lang="nl-BE" dirty="0" smtClean="0"/>
-              <a:t>De lokale computer heeft de laatste snapshot</a:t>
-            </a:r>
-          </a:p>
-          <a:p>
-            <a:r>
-              <a:rPr lang="nl-BE" dirty="0" smtClean="0"/>
-              <a:t>Makkelijk om werk te delen</a:t>
-            </a:r>
-          </a:p>
-          <a:p>
-            <a:r>
-              <a:rPr lang="nl-BE" dirty="0" smtClean="0"/>
-              <a:t>Nog altijd gevaarlijk om een versie kapot te maken</a:t>
-            </a:r>
+              <a:rPr lang="nl-BE" dirty="0" err="1" smtClean="0"/>
+              <a:t>Keeps</a:t>
+            </a:r>
+            <a:r>
+              <a:rPr lang="nl-BE" dirty="0" smtClean="0"/>
+              <a:t> changes in a </a:t>
+            </a:r>
+            <a:r>
+              <a:rPr lang="nl-BE" dirty="0" err="1" smtClean="0"/>
+              <a:t>central</a:t>
+            </a:r>
+            <a:r>
+              <a:rPr lang="nl-BE" dirty="0" smtClean="0"/>
+              <a:t> database</a:t>
+            </a:r>
+          </a:p>
+          <a:p>
+            <a:r>
+              <a:rPr lang="nl-BE" dirty="0" smtClean="0"/>
+              <a:t>The </a:t>
+            </a:r>
+            <a:r>
+              <a:rPr lang="nl-BE" dirty="0" err="1" smtClean="0"/>
+              <a:t>local</a:t>
+            </a:r>
+            <a:r>
+              <a:rPr lang="nl-BE" dirty="0" smtClean="0"/>
+              <a:t> computer has  </a:t>
+            </a:r>
+            <a:r>
+              <a:rPr lang="nl-BE" dirty="0" err="1" smtClean="0"/>
+              <a:t>the</a:t>
+            </a:r>
+            <a:r>
+              <a:rPr lang="nl-BE" dirty="0" smtClean="0"/>
+              <a:t> last snapshot</a:t>
+            </a:r>
+          </a:p>
+          <a:p>
+            <a:r>
+              <a:rPr lang="nl-BE" dirty="0" smtClean="0"/>
+              <a:t>Easy </a:t>
+            </a:r>
+            <a:r>
+              <a:rPr lang="nl-BE" dirty="0" err="1" smtClean="0"/>
+              <a:t>to</a:t>
+            </a:r>
+            <a:r>
+              <a:rPr lang="nl-BE" dirty="0" smtClean="0"/>
+              <a:t> share </a:t>
+            </a:r>
+            <a:r>
+              <a:rPr lang="nl-BE" dirty="0" err="1" smtClean="0"/>
+              <a:t>work</a:t>
+            </a:r>
+            <a:endParaRPr lang="nl-BE" dirty="0" smtClean="0"/>
+          </a:p>
+          <a:p>
+            <a:r>
+              <a:rPr lang="nl-BE" dirty="0" err="1" smtClean="0"/>
+              <a:t>Still</a:t>
+            </a:r>
+            <a:r>
+              <a:rPr lang="nl-BE" dirty="0" smtClean="0"/>
+              <a:t> </a:t>
+            </a:r>
+            <a:r>
+              <a:rPr lang="nl-BE" dirty="0" err="1" smtClean="0"/>
+              <a:t>dangerous</a:t>
+            </a:r>
+            <a:r>
+              <a:rPr lang="nl-BE" dirty="0" smtClean="0"/>
+              <a:t> </a:t>
+            </a:r>
+            <a:r>
+              <a:rPr lang="nl-BE" dirty="0" err="1" smtClean="0"/>
+              <a:t>to</a:t>
+            </a:r>
+            <a:r>
+              <a:rPr lang="nl-BE" dirty="0" smtClean="0"/>
+              <a:t> break a </a:t>
+            </a:r>
+            <a:r>
+              <a:rPr lang="nl-BE" dirty="0" err="1" smtClean="0"/>
+              <a:t>version</a:t>
+            </a:r>
+            <a:endParaRPr lang="nl-BE" dirty="0" smtClean="0"/>
           </a:p>
           <a:p>
             <a:r>
@@ -4437,15 +5087,7 @@
             </a:r>
             <a:r>
               <a:rPr lang="nl-BE" dirty="0" smtClean="0"/>
-              <a:t> (</a:t>
-            </a:r>
-            <a:r>
-              <a:rPr lang="nl-BE" dirty="0" err="1" smtClean="0"/>
-              <a:t>bvb</a:t>
-            </a:r>
-            <a:r>
-              <a:rPr lang="nl-BE" dirty="0" smtClean="0"/>
-              <a:t>: GitHub)</a:t>
+              <a:t> (ex: GitHub)</a:t>
             </a:r>
           </a:p>
           <a:p>
@@ -4566,19 +5208,23 @@
           <a:p>
             <a:r>
               <a:rPr lang="nl-BE" dirty="0" smtClean="0"/>
-              <a:t>Moderne </a:t>
-            </a:r>
-            <a:r>
-              <a:rPr lang="nl-BE" dirty="0" smtClean="0"/>
-              <a:t>3</a:t>
+              <a:t>Modern 3</a:t>
             </a:r>
             <a:r>
               <a:rPr lang="nl-BE" baseline="30000" dirty="0" smtClean="0"/>
-              <a:t>de</a:t>
-            </a:r>
-            <a:r>
-              <a:rPr lang="nl-BE" dirty="0" smtClean="0"/>
-              <a:t> generatie VCS</a:t>
+              <a:t>th</a:t>
+            </a:r>
+            <a:r>
+              <a:rPr lang="nl-BE" dirty="0" smtClean="0"/>
+              <a:t> </a:t>
+            </a:r>
+            <a:r>
+              <a:rPr lang="nl-BE" dirty="0" err="1" smtClean="0"/>
+              <a:t>generation</a:t>
+            </a:r>
+            <a:r>
+              <a:rPr lang="nl-BE" dirty="0" smtClean="0"/>
+              <a:t> VCS</a:t>
             </a:r>
           </a:p>
           <a:p>
@@ -4589,10 +5235,6 @@
           </a:p>
           <a:p>
             <a:r>
-              <a:rPr lang="nl-BE" dirty="0" smtClean="0"/>
-              <a:t>Gecreëerd door </a:t>
-            </a:r>
-            <a:r>
               <a:rPr lang="nl-BE" dirty="0" err="1" smtClean="0"/>
               <a:t>Linus</a:t>
             </a:r>
@@ -4608,32 +5250,116 @@
               <a:rPr lang="nl-BE" dirty="0" smtClean="0"/>
               <a:t> (LINUX)</a:t>
             </a:r>
+          </a:p>
+          <a:p>
+            <a:r>
+              <a:rPr lang="nl-BE" dirty="0" smtClean="0"/>
+              <a:t>For </a:t>
+            </a:r>
+            <a:r>
+              <a:rPr lang="nl-BE" dirty="0" err="1" smtClean="0"/>
+              <a:t>little</a:t>
+            </a:r>
+            <a:r>
+              <a:rPr lang="nl-BE" dirty="0" smtClean="0"/>
+              <a:t> </a:t>
+            </a:r>
+            <a:r>
+              <a:rPr lang="nl-BE" dirty="0" err="1" smtClean="0"/>
+              <a:t>and</a:t>
+            </a:r>
+            <a:r>
+              <a:rPr lang="nl-BE" dirty="0" smtClean="0"/>
+              <a:t> </a:t>
+            </a:r>
+            <a:r>
+              <a:rPr lang="nl-BE" dirty="0" err="1" smtClean="0"/>
+              <a:t>huge</a:t>
+            </a:r>
+            <a:r>
+              <a:rPr lang="nl-BE" dirty="0" smtClean="0"/>
+              <a:t> </a:t>
+            </a:r>
+            <a:r>
+              <a:rPr lang="nl-BE" dirty="0" err="1" smtClean="0"/>
+              <a:t>projects</a:t>
+            </a:r>
             <a:endParaRPr lang="nl-BE" dirty="0" smtClean="0"/>
           </a:p>
           <a:p>
             <a:r>
               <a:rPr lang="nl-BE" dirty="0" smtClean="0"/>
-              <a:t>Zowel voor kleine als heel grote projecten</a:t>
-            </a:r>
-          </a:p>
-          <a:p>
-            <a:r>
-              <a:rPr lang="nl-BE" dirty="0" smtClean="0"/>
-              <a:t>Complex met </a:t>
-            </a:r>
-            <a:r>
-              <a:rPr lang="nl-BE" dirty="0" err="1" smtClean="0"/>
-              <a:t>stijle</a:t>
-            </a:r>
-            <a:r>
-              <a:rPr lang="nl-BE" dirty="0" smtClean="0"/>
-              <a:t> leercurve</a:t>
-            </a:r>
-          </a:p>
-          <a:p>
-            <a:r>
-              <a:rPr lang="nl-BE" dirty="0" smtClean="0"/>
-              <a:t>Je leert het door het veel te gebruiken</a:t>
+              <a:t>Complex </a:t>
+            </a:r>
+            <a:r>
+              <a:rPr lang="nl-BE" dirty="0" err="1" smtClean="0"/>
+              <a:t>with</a:t>
+            </a:r>
+            <a:r>
+              <a:rPr lang="nl-BE" dirty="0" smtClean="0"/>
+              <a:t> </a:t>
+            </a:r>
+            <a:r>
+              <a:rPr lang="nl-BE" dirty="0" err="1" smtClean="0"/>
+              <a:t>steep</a:t>
+            </a:r>
+            <a:r>
+              <a:rPr lang="nl-BE" dirty="0" smtClean="0"/>
+              <a:t> </a:t>
+            </a:r>
+            <a:r>
+              <a:rPr lang="nl-BE" dirty="0" err="1" smtClean="0"/>
+              <a:t>learning</a:t>
+            </a:r>
+            <a:r>
+              <a:rPr lang="nl-BE" dirty="0" smtClean="0"/>
+              <a:t> curve</a:t>
+            </a:r>
+          </a:p>
+          <a:p>
+            <a:r>
+              <a:rPr lang="nl-BE" dirty="0" smtClean="0"/>
+              <a:t>Using </a:t>
+            </a:r>
+            <a:r>
+              <a:rPr lang="nl-BE" dirty="0" err="1" smtClean="0"/>
+              <a:t>it</a:t>
+            </a:r>
+            <a:r>
+              <a:rPr lang="nl-BE" dirty="0" smtClean="0"/>
+              <a:t> </a:t>
+            </a:r>
+            <a:r>
+              <a:rPr lang="nl-BE" dirty="0" err="1" smtClean="0"/>
+              <a:t>alot</a:t>
+            </a:r>
+            <a:r>
+              <a:rPr lang="nl-BE" dirty="0" smtClean="0"/>
+              <a:t> </a:t>
+            </a:r>
+            <a:r>
+              <a:rPr lang="nl-BE" dirty="0" err="1" smtClean="0"/>
+              <a:t>will</a:t>
+            </a:r>
+            <a:r>
+              <a:rPr lang="nl-BE" dirty="0" smtClean="0"/>
+              <a:t> </a:t>
+            </a:r>
+            <a:r>
+              <a:rPr lang="nl-BE" dirty="0" err="1" smtClean="0"/>
+              <a:t>teach</a:t>
+            </a:r>
+            <a:r>
+              <a:rPr lang="nl-BE" dirty="0" smtClean="0"/>
+              <a:t> </a:t>
+            </a:r>
+            <a:r>
+              <a:rPr lang="nl-BE" dirty="0" err="1" smtClean="0"/>
+              <a:t>you</a:t>
+            </a:r>
+            <a:r>
+              <a:rPr lang="nl-BE" dirty="0" smtClean="0"/>
+              <a:t> GIT</a:t>
             </a:r>
           </a:p>
           <a:p>
@@ -4817,8 +5543,12 @@
           <a:lstStyle/>
           <a:p>
             <a:r>
-              <a:rPr lang="nl-BE" dirty="0" smtClean="0"/>
-              <a:t>Git installeren</a:t>
+              <a:rPr lang="nl-BE" dirty="0" err="1" smtClean="0"/>
+              <a:t>Install</a:t>
+            </a:r>
+            <a:r>
+              <a:rPr lang="nl-BE" dirty="0" smtClean="0"/>
+              <a:t> Git</a:t>
             </a:r>
             <a:endParaRPr lang="en-US" dirty="0"/>
           </a:p>

</xml_diff>

<commit_message>
commit to show up to date branch
</commit_message>
<xml_diff>
--- a/GIT.pptx
+++ b/GIT.pptx
@@ -19,8 +19,9 @@
     <p:sldId id="267" r:id="rId13"/>
     <p:sldId id="268" r:id="rId14"/>
     <p:sldId id="269" r:id="rId15"/>
-    <p:sldId id="270" r:id="rId16"/>
-    <p:sldId id="271" r:id="rId17"/>
+    <p:sldId id="271" r:id="rId16"/>
+    <p:sldId id="270" r:id="rId17"/>
+    <p:sldId id="272" r:id="rId18"/>
   </p:sldIdLst>
   <p:sldSz cx="12192000" cy="6858000"/>
   <p:notesSz cx="6858000" cy="9144000"/>
@@ -4166,33 +4167,56 @@
           <a:bodyPr/>
           <a:lstStyle/>
           <a:p>
-            <a:endParaRPr lang="en-US"/>
-          </a:p>
-        </p:txBody>
-      </p:sp>
-      <p:sp>
-        <p:nvSpPr>
-          <p:cNvPr id="3" name="Content Placeholder 2"/>
-          <p:cNvSpPr>
-            <a:spLocks noGrp="1"/>
-          </p:cNvSpPr>
+            <a:r>
+              <a:rPr lang="nl-BE" dirty="0" err="1" smtClean="0"/>
+              <a:t>Unstaged</a:t>
+            </a:r>
+            <a:r>
+              <a:rPr lang="nl-BE" dirty="0"/>
+              <a:t> </a:t>
+            </a:r>
+            <a:r>
+              <a:rPr lang="nl-BE" dirty="0" smtClean="0"/>
+              <a:t>/ </a:t>
+            </a:r>
+            <a:r>
+              <a:rPr lang="nl-BE" dirty="0" err="1" smtClean="0"/>
+              <a:t>Untracked</a:t>
+            </a:r>
+            <a:endParaRPr lang="en-US" dirty="0"/>
+          </a:p>
+        </p:txBody>
+      </p:sp>
+      <p:pic>
+        <p:nvPicPr>
+          <p:cNvPr id="4" name="Content Placeholder 3"/>
+          <p:cNvPicPr>
+            <a:picLocks noGrp="1" noChangeAspect="1"/>
+          </p:cNvPicPr>
           <p:nvPr>
             <p:ph idx="1"/>
           </p:nvPr>
-        </p:nvSpPr>
-        <p:spPr/>
-        <p:txBody>
-          <a:bodyPr/>
-          <a:lstStyle/>
-          <a:p>
-            <a:endParaRPr lang="en-US"/>
-          </a:p>
-        </p:txBody>
-      </p:sp>
+        </p:nvPicPr>
+        <p:blipFill>
+          <a:blip r:embed="rId2"/>
+          <a:stretch>
+            <a:fillRect/>
+          </a:stretch>
+        </p:blipFill>
+        <p:spPr>
+          <a:xfrm>
+            <a:off x="1271587" y="2362994"/>
+            <a:ext cx="9648825" cy="3276600"/>
+          </a:xfrm>
+          <a:prstGeom prst="rect">
+            <a:avLst/>
+          </a:prstGeom>
+        </p:spPr>
+      </p:pic>
     </p:spTree>
     <p:extLst>
       <p:ext uri="{BB962C8B-B14F-4D97-AF65-F5344CB8AC3E}">
-        <p14:creationId xmlns:p14="http://schemas.microsoft.com/office/powerpoint/2010/main" val="1055543469"/>
+        <p14:creationId xmlns:p14="http://schemas.microsoft.com/office/powerpoint/2010/main" val="2060847589"/>
       </p:ext>
     </p:extLst>
   </p:cSld>
@@ -4236,19 +4260,7 @@
           <a:p>
             <a:r>
               <a:rPr lang="nl-BE" dirty="0" err="1" smtClean="0"/>
-              <a:t>Unstaged</a:t>
-            </a:r>
-            <a:r>
-              <a:rPr lang="nl-BE" dirty="0"/>
-              <a:t> </a:t>
-            </a:r>
-            <a:r>
-              <a:rPr lang="nl-BE" dirty="0" smtClean="0"/>
-              <a:t>/ </a:t>
-            </a:r>
-            <a:r>
-              <a:rPr lang="nl-BE" dirty="0" err="1" smtClean="0"/>
-              <a:t>Untracked</a:t>
+              <a:t>Staged</a:t>
             </a:r>
             <a:endParaRPr lang="en-US" dirty="0"/>
           </a:p>
@@ -4272,8 +4284,8 @@
         </p:blipFill>
         <p:spPr>
           <a:xfrm>
-            <a:off x="1271587" y="2362994"/>
-            <a:ext cx="9648825" cy="3276600"/>
+            <a:off x="3033712" y="2720181"/>
+            <a:ext cx="6124575" cy="2562225"/>
           </a:xfrm>
           <a:prstGeom prst="rect">
             <a:avLst/>
@@ -4283,7 +4295,86 @@
     </p:spTree>
     <p:extLst>
       <p:ext uri="{BB962C8B-B14F-4D97-AF65-F5344CB8AC3E}">
-        <p14:creationId xmlns:p14="http://schemas.microsoft.com/office/powerpoint/2010/main" val="2060847589"/>
+        <p14:creationId xmlns:p14="http://schemas.microsoft.com/office/powerpoint/2010/main" val="1055543469"/>
+      </p:ext>
+    </p:extLst>
+  </p:cSld>
+  <p:clrMapOvr>
+    <a:masterClrMapping/>
+  </p:clrMapOvr>
+</p:sld>
+</file>
+
+<file path=ppt/slides/slide17.xml><?xml version="1.0" encoding="utf-8"?>
+<p:sld xmlns:a="http://schemas.openxmlformats.org/drawingml/2006/main" xmlns:r="http://schemas.openxmlformats.org/officeDocument/2006/relationships" xmlns:p="http://schemas.openxmlformats.org/presentationml/2006/main">
+  <p:cSld>
+    <p:spTree>
+      <p:nvGrpSpPr>
+        <p:cNvPr id="1" name=""/>
+        <p:cNvGrpSpPr/>
+        <p:nvPr/>
+      </p:nvGrpSpPr>
+      <p:grpSpPr>
+        <a:xfrm>
+          <a:off x="0" y="0"/>
+          <a:ext cx="0" cy="0"/>
+          <a:chOff x="0" y="0"/>
+          <a:chExt cx="0" cy="0"/>
+        </a:xfrm>
+      </p:grpSpPr>
+      <p:sp>
+        <p:nvSpPr>
+          <p:cNvPr id="2" name="Title 1"/>
+          <p:cNvSpPr>
+            <a:spLocks noGrp="1"/>
+          </p:cNvSpPr>
+          <p:nvPr>
+            <p:ph type="title"/>
+          </p:nvPr>
+        </p:nvSpPr>
+        <p:spPr/>
+        <p:txBody>
+          <a:bodyPr/>
+          <a:lstStyle/>
+          <a:p>
+            <a:r>
+              <a:rPr lang="nl-BE" dirty="0" err="1" smtClean="0"/>
+              <a:t>Commited</a:t>
+            </a:r>
+            <a:endParaRPr lang="en-US" dirty="0"/>
+          </a:p>
+        </p:txBody>
+      </p:sp>
+      <p:pic>
+        <p:nvPicPr>
+          <p:cNvPr id="4" name="Content Placeholder 3"/>
+          <p:cNvPicPr>
+            <a:picLocks noGrp="1" noChangeAspect="1"/>
+          </p:cNvPicPr>
+          <p:nvPr>
+            <p:ph idx="1"/>
+          </p:nvPr>
+        </p:nvPicPr>
+        <p:blipFill>
+          <a:blip r:embed="rId2"/>
+          <a:stretch>
+            <a:fillRect/>
+          </a:stretch>
+        </p:blipFill>
+        <p:spPr>
+          <a:xfrm>
+            <a:off x="838200" y="1690688"/>
+            <a:ext cx="10515600" cy="1040987"/>
+          </a:xfrm>
+          <a:prstGeom prst="rect">
+            <a:avLst/>
+          </a:prstGeom>
+        </p:spPr>
+      </p:pic>
+    </p:spTree>
+    <p:extLst>
+      <p:ext uri="{BB962C8B-B14F-4D97-AF65-F5344CB8AC3E}">
+        <p14:creationId xmlns:p14="http://schemas.microsoft.com/office/powerpoint/2010/main" val="416160100"/>
       </p:ext>
     </p:extLst>
   </p:cSld>

</xml_diff>